<commit_message>
added Vec2 and altered it so that it wouldn't conflict with Utilities, as well as added sprites for the tiles
</commit_message>
<xml_diff>
--- a/Documents/Deca-Cube Pitch.pptx
+++ b/Documents/Deca-Cube Pitch.pptx
@@ -114,6 +114,11 @@
       </a:defRPr>
     </a:lvl9pPr>
   </p:defaultTextStyle>
+  <p:extLst>
+    <p:ext uri="{EFAFB233-063F-42B5-8137-9DF3F51BA10A}">
+      <p15:sldGuideLst xmlns:p15="http://schemas.microsoft.com/office/powerpoint/2012/main"/>
+    </p:ext>
+  </p:extLst>
 </p:presentation>
 </file>
 
@@ -6099,7 +6104,7 @@
           <a:p>
             <a:fld id="{D1D1EADE-8E88-4C7C-8AC5-FB148DE4940E}" type="datetime1">
               <a:rPr lang="en-US" smtClean="0"/>
-              <a:t>1/18/2025</a:t>
+              <a:t>1/21/2025</a:t>
             </a:fld>
             <a:endParaRPr lang="en-US"/>
           </a:p>
@@ -6299,7 +6304,7 @@
           <a:p>
             <a:fld id="{EC3C8B9C-477D-492A-96AD-1FC2CC997A73}" type="datetime1">
               <a:rPr lang="en-US" smtClean="0"/>
-              <a:t>1/18/2025</a:t>
+              <a:t>1/21/2025</a:t>
             </a:fld>
             <a:endParaRPr lang="en-US"/>
           </a:p>
@@ -6509,7 +6514,7 @@
           <a:p>
             <a:fld id="{42D3AED5-E26D-4E29-B1B3-7847B6779594}" type="datetime1">
               <a:rPr lang="en-US" smtClean="0"/>
-              <a:t>1/18/2025</a:t>
+              <a:t>1/21/2025</a:t>
             </a:fld>
             <a:endParaRPr lang="en-US"/>
           </a:p>
@@ -6709,7 +6714,7 @@
           <a:p>
             <a:fld id="{157B6794-849E-4626-908B-D15793550EFB}" type="datetime1">
               <a:rPr lang="en-US" smtClean="0"/>
-              <a:t>1/18/2025</a:t>
+              <a:t>1/21/2025</a:t>
             </a:fld>
             <a:endParaRPr lang="en-US"/>
           </a:p>
@@ -6985,7 +6990,7 @@
           <a:p>
             <a:fld id="{63DB64E7-5594-42A3-ADBF-E95A7ACEAD64}" type="datetime1">
               <a:rPr lang="en-US" smtClean="0"/>
-              <a:t>1/18/2025</a:t>
+              <a:t>1/21/2025</a:t>
             </a:fld>
             <a:endParaRPr lang="en-US"/>
           </a:p>
@@ -7258,7 +7263,7 @@
           <a:p>
             <a:fld id="{18462B0B-D248-4FFB-8695-AD7FA4B1284A}" type="datetime1">
               <a:rPr lang="en-US" smtClean="0"/>
-              <a:t>1/18/2025</a:t>
+              <a:t>1/21/2025</a:t>
             </a:fld>
             <a:endParaRPr lang="en-US"/>
           </a:p>
@@ -7681,7 +7686,7 @@
           <a:p>
             <a:fld id="{D0378EFB-9159-4510-B73F-4F0409ADE937}" type="datetime1">
               <a:rPr lang="en-US" smtClean="0"/>
-              <a:t>1/18/2025</a:t>
+              <a:t>1/21/2025</a:t>
             </a:fld>
             <a:endParaRPr lang="en-US"/>
           </a:p>
@@ -7823,7 +7828,7 @@
           <a:p>
             <a:fld id="{89BC9412-2452-4BED-A324-9D8C115361AD}" type="datetime1">
               <a:rPr lang="en-US" smtClean="0"/>
-              <a:t>1/18/2025</a:t>
+              <a:t>1/21/2025</a:t>
             </a:fld>
             <a:endParaRPr lang="en-US"/>
           </a:p>
@@ -7936,7 +7941,7 @@
           <a:p>
             <a:fld id="{F5318F62-D251-40E8-A23C-F4CFE9FEAB41}" type="datetime1">
               <a:rPr lang="en-US" smtClean="0"/>
-              <a:t>1/18/2025</a:t>
+              <a:t>1/21/2025</a:t>
             </a:fld>
             <a:endParaRPr lang="en-US"/>
           </a:p>
@@ -8249,7 +8254,7 @@
           <a:p>
             <a:fld id="{44F76144-149E-4874-93A5-554A0357CF82}" type="datetime1">
               <a:rPr lang="en-US" smtClean="0"/>
-              <a:t>1/18/2025</a:t>
+              <a:t>1/21/2025</a:t>
             </a:fld>
             <a:endParaRPr lang="en-US"/>
           </a:p>
@@ -8542,7 +8547,7 @@
           <a:p>
             <a:fld id="{50BA65D8-0540-4835-AE5C-25D29DBA01BE}" type="datetime1">
               <a:rPr lang="en-US" smtClean="0"/>
-              <a:t>1/18/2025</a:t>
+              <a:t>1/21/2025</a:t>
             </a:fld>
             <a:endParaRPr lang="en-US"/>
           </a:p>
@@ -8784,7 +8789,7 @@
           <a:p>
             <a:fld id="{E31BA835-12AC-4E8F-955A-EA3F4DE2791F}" type="datetime1">
               <a:rPr lang="en-US" smtClean="0"/>
-              <a:t>1/18/2025</a:t>
+              <a:t>1/21/2025</a:t>
             </a:fld>
             <a:endParaRPr lang="en-US"/>
           </a:p>
@@ -10715,7 +10720,7 @@
         </p:blipFill>
         <p:spPr>
           <a:xfrm>
-            <a:off x="7463684" y="1069848"/>
+            <a:off x="9182756" y="1078597"/>
             <a:ext cx="1523606" cy="1523606"/>
           </a:xfrm>
           <a:prstGeom prst="rect">
@@ -10772,7 +10777,7 @@
         </p:nvSpPr>
         <p:spPr>
           <a:xfrm>
-            <a:off x="7463684" y="2670048"/>
+            <a:off x="9182756" y="2679192"/>
             <a:ext cx="1316736" cy="369332"/>
           </a:xfrm>
           <a:prstGeom prst="rect">
@@ -10789,6 +10794,184 @@
             <a:r>
               <a:rPr lang="en-CA" dirty="0"/>
               <a:t>Gunner</a:t>
+            </a:r>
+          </a:p>
+        </p:txBody>
+      </p:sp>
+      <p:pic>
+        <p:nvPicPr>
+          <p:cNvPr id="5" name="Picture 4">
+            <a:extLst>
+              <a:ext uri="{FF2B5EF4-FFF2-40B4-BE49-F238E27FC236}">
+                <a16:creationId xmlns:a16="http://schemas.microsoft.com/office/drawing/2014/main" id="{DC4DFEB5-52E6-6B46-D615-38B0791CD8E0}"/>
+              </a:ext>
+            </a:extLst>
+          </p:cNvPr>
+          <p:cNvPicPr>
+            <a:picLocks noChangeAspect="1"/>
+          </p:cNvPicPr>
+          <p:nvPr/>
+        </p:nvPicPr>
+        <p:blipFill>
+          <a:blip r:embed="rId4">
+            <a:extLst>
+              <a:ext uri="{28A0092B-C50C-407E-A947-70E740481C1C}">
+                <a14:useLocalDpi xmlns:a14="http://schemas.microsoft.com/office/drawing/2010/main" val="0"/>
+              </a:ext>
+            </a:extLst>
+          </a:blip>
+          <a:stretch>
+            <a:fillRect/>
+          </a:stretch>
+        </p:blipFill>
+        <p:spPr>
+          <a:xfrm>
+            <a:off x="5659170" y="3595157"/>
+            <a:ext cx="1431519" cy="1431519"/>
+          </a:xfrm>
+          <a:prstGeom prst="rect">
+            <a:avLst/>
+          </a:prstGeom>
+        </p:spPr>
+      </p:pic>
+      <p:pic>
+        <p:nvPicPr>
+          <p:cNvPr id="11" name="Picture 10">
+            <a:extLst>
+              <a:ext uri="{FF2B5EF4-FFF2-40B4-BE49-F238E27FC236}">
+                <a16:creationId xmlns:a16="http://schemas.microsoft.com/office/drawing/2014/main" id="{1F802FF1-908C-DA0F-B314-66DDE5D2E734}"/>
+              </a:ext>
+            </a:extLst>
+          </p:cNvPr>
+          <p:cNvPicPr>
+            <a:picLocks noChangeAspect="1"/>
+          </p:cNvPicPr>
+          <p:nvPr/>
+        </p:nvPicPr>
+        <p:blipFill>
+          <a:blip r:embed="rId5">
+            <a:extLst>
+              <a:ext uri="{28A0092B-C50C-407E-A947-70E740481C1C}">
+                <a14:useLocalDpi xmlns:a14="http://schemas.microsoft.com/office/drawing/2010/main" val="0"/>
+              </a:ext>
+            </a:extLst>
+          </a:blip>
+          <a:stretch>
+            <a:fillRect/>
+          </a:stretch>
+        </p:blipFill>
+        <p:spPr>
+          <a:xfrm>
+            <a:off x="6990105" y="3595157"/>
+            <a:ext cx="1431519" cy="1431519"/>
+          </a:xfrm>
+          <a:prstGeom prst="rect">
+            <a:avLst/>
+          </a:prstGeom>
+        </p:spPr>
+      </p:pic>
+      <p:pic>
+        <p:nvPicPr>
+          <p:cNvPr id="13" name="Picture 12">
+            <a:extLst>
+              <a:ext uri="{FF2B5EF4-FFF2-40B4-BE49-F238E27FC236}">
+                <a16:creationId xmlns:a16="http://schemas.microsoft.com/office/drawing/2014/main" id="{76FD4D46-059D-1F5E-722D-F70782EE12CA}"/>
+              </a:ext>
+            </a:extLst>
+          </p:cNvPr>
+          <p:cNvPicPr>
+            <a:picLocks noChangeAspect="1"/>
+          </p:cNvPicPr>
+          <p:nvPr/>
+        </p:nvPicPr>
+        <p:blipFill>
+          <a:blip r:embed="rId6">
+            <a:extLst>
+              <a:ext uri="{28A0092B-C50C-407E-A947-70E740481C1C}">
+                <a14:useLocalDpi xmlns:a14="http://schemas.microsoft.com/office/drawing/2010/main" val="0"/>
+              </a:ext>
+            </a:extLst>
+          </a:blip>
+          <a:stretch>
+            <a:fillRect/>
+          </a:stretch>
+        </p:blipFill>
+        <p:spPr>
+          <a:xfrm>
+            <a:off x="9182756" y="3493994"/>
+            <a:ext cx="1523607" cy="1523607"/>
+          </a:xfrm>
+          <a:prstGeom prst="rect">
+            <a:avLst/>
+          </a:prstGeom>
+        </p:spPr>
+      </p:pic>
+      <p:sp>
+        <p:nvSpPr>
+          <p:cNvPr id="14" name="TextBox 13">
+            <a:extLst>
+              <a:ext uri="{FF2B5EF4-FFF2-40B4-BE49-F238E27FC236}">
+                <a16:creationId xmlns:a16="http://schemas.microsoft.com/office/drawing/2014/main" id="{00F633DF-2074-5C5E-54F2-FA8E27C55FE4}"/>
+              </a:ext>
+            </a:extLst>
+          </p:cNvPr>
+          <p:cNvSpPr txBox="1"/>
+          <p:nvPr/>
+        </p:nvSpPr>
+        <p:spPr>
+          <a:xfrm>
+            <a:off x="5660050" y="5120640"/>
+            <a:ext cx="886781" cy="369332"/>
+          </a:xfrm>
+          <a:prstGeom prst="rect">
+            <a:avLst/>
+          </a:prstGeom>
+          <a:noFill/>
+        </p:spPr>
+        <p:txBody>
+          <a:bodyPr wrap="none" rtlCol="0">
+            <a:spAutoFit/>
+          </a:bodyPr>
+          <a:lstStyle/>
+          <a:p>
+            <a:r>
+              <a:rPr lang="en-CA" dirty="0"/>
+              <a:t>Flipper</a:t>
+            </a:r>
+          </a:p>
+        </p:txBody>
+      </p:sp>
+      <p:sp>
+        <p:nvSpPr>
+          <p:cNvPr id="15" name="TextBox 14">
+            <a:extLst>
+              <a:ext uri="{FF2B5EF4-FFF2-40B4-BE49-F238E27FC236}">
+                <a16:creationId xmlns:a16="http://schemas.microsoft.com/office/drawing/2014/main" id="{9CC0B191-B943-DC9F-9447-C56AD6352C62}"/>
+              </a:ext>
+            </a:extLst>
+          </p:cNvPr>
+          <p:cNvSpPr txBox="1"/>
+          <p:nvPr/>
+        </p:nvSpPr>
+        <p:spPr>
+          <a:xfrm>
+            <a:off x="9182756" y="5120640"/>
+            <a:ext cx="1091966" cy="369332"/>
+          </a:xfrm>
+          <a:prstGeom prst="rect">
+            <a:avLst/>
+          </a:prstGeom>
+          <a:noFill/>
+        </p:spPr>
+        <p:txBody>
+          <a:bodyPr wrap="none" rtlCol="0">
+            <a:spAutoFit/>
+          </a:bodyPr>
+          <a:lstStyle/>
+          <a:p>
+            <a:r>
+              <a:rPr lang="en-CA" dirty="0"/>
+              <a:t>Defender</a:t>
             </a:r>
           </a:p>
         </p:txBody>

</xml_diff>